<commit_message>
Parsing for picture references (now need the rels parser)
</commit_message>
<xml_diff>
--- a/src/test/resources/TitleSlideOnly.pptx
+++ b/src/test/resources/TitleSlideOnly.pptx
@@ -1,11 +1,13 @@
 
 <file path=ppt/presentation.xml><?xml version="1.0" encoding="utf-8"?>
-<p:presentation xmlns:a="http://schemas.openxmlformats.org/drawingml/2006/main" xmlns:r="http://schemas.openxmlformats.org/officeDocument/2006/relationships" xmlns:mc="http://schemas.openxmlformats.org/markup-compatibility/2006" xmlns:mv="urn:schemas-microsoft-com:mac:vml" xmlns:p="http://schemas.openxmlformats.org/presentationml/2006/main" mc:Ignorable="mv" mc:PreserveAttributes="mv:*" saveSubsetFonts="1" autoCompressPictures="0">
+<p:presentation xmlns:a="http://schemas.openxmlformats.org/drawingml/2006/main" xmlns:r="http://schemas.openxmlformats.org/officeDocument/2006/relationships" xmlns:p="http://schemas.openxmlformats.org/presentationml/2006/main" saveSubsetFonts="1" autoCompressPictures="0">
   <p:sldMasterIdLst>
     <p:sldMasterId id="2147483648" r:id="rId1"/>
   </p:sldMasterIdLst>
   <p:sldIdLst>
     <p:sldId id="256" r:id="rId2"/>
+    <p:sldId id="257" r:id="rId3"/>
+    <p:sldId id="258" r:id="rId4"/>
   </p:sldIdLst>
   <p:sldSz cx="9144000" cy="6858000" type="screen4x3"/>
   <p:notesSz cx="6858000" cy="9144000"/>
@@ -108,7 +110,7 @@
 </file>
 
 <file path=ppt/slideLayouts/slideLayout1.xml><?xml version="1.0" encoding="utf-8"?>
-<p:sldLayout xmlns:a="http://schemas.openxmlformats.org/drawingml/2006/main" xmlns:r="http://schemas.openxmlformats.org/officeDocument/2006/relationships" xmlns:mc="http://schemas.openxmlformats.org/markup-compatibility/2006" xmlns:mv="urn:schemas-microsoft-com:mac:vml" xmlns:p="http://schemas.openxmlformats.org/presentationml/2006/main" mc:Ignorable="mv" mc:PreserveAttributes="mv:*" type="title" preserve="1">
+<p:sldLayout xmlns:a="http://schemas.openxmlformats.org/drawingml/2006/main" xmlns:r="http://schemas.openxmlformats.org/officeDocument/2006/relationships" xmlns:p="http://schemas.openxmlformats.org/presentationml/2006/main" type="title" preserve="1">
   <p:cSld name="Title Slide">
     <p:spTree>
       <p:nvGrpSpPr>
@@ -288,7 +290,7 @@
           <a:p>
             <a:fld id="{35545FA2-D69E-F44A-846D-1D09D44220AC}" type="datetimeFigureOut">
               <a:rPr lang="en-US" smtClean="0"/>
-              <a:t>4/12/11</a:t>
+              <a:t>5/17/11</a:t>
             </a:fld>
             <a:endParaRPr lang="en-US"/>
           </a:p>
@@ -345,7 +347,7 @@
 </file>
 
 <file path=ppt/slideLayouts/slideLayout10.xml><?xml version="1.0" encoding="utf-8"?>
-<p:sldLayout xmlns:a="http://schemas.openxmlformats.org/drawingml/2006/main" xmlns:r="http://schemas.openxmlformats.org/officeDocument/2006/relationships" xmlns:mc="http://schemas.openxmlformats.org/markup-compatibility/2006" xmlns:mv="urn:schemas-microsoft-com:mac:vml" xmlns:p="http://schemas.openxmlformats.org/presentationml/2006/main" mc:Ignorable="mv" mc:PreserveAttributes="mv:*" type="vertTx" preserve="1">
+<p:sldLayout xmlns:a="http://schemas.openxmlformats.org/drawingml/2006/main" xmlns:r="http://schemas.openxmlformats.org/officeDocument/2006/relationships" xmlns:p="http://schemas.openxmlformats.org/presentationml/2006/main" type="vertTx" preserve="1">
   <p:cSld name="Title and Vertical Text">
     <p:spTree>
       <p:nvGrpSpPr>
@@ -453,7 +455,7 @@
           <a:p>
             <a:fld id="{35545FA2-D69E-F44A-846D-1D09D44220AC}" type="datetimeFigureOut">
               <a:rPr lang="en-US" smtClean="0"/>
-              <a:t>4/12/11</a:t>
+              <a:t>5/17/11</a:t>
             </a:fld>
             <a:endParaRPr lang="en-US"/>
           </a:p>
@@ -510,7 +512,7 @@
 </file>
 
 <file path=ppt/slideLayouts/slideLayout11.xml><?xml version="1.0" encoding="utf-8"?>
-<p:sldLayout xmlns:a="http://schemas.openxmlformats.org/drawingml/2006/main" xmlns:r="http://schemas.openxmlformats.org/officeDocument/2006/relationships" xmlns:mc="http://schemas.openxmlformats.org/markup-compatibility/2006" xmlns:mv="urn:schemas-microsoft-com:mac:vml" xmlns:p="http://schemas.openxmlformats.org/presentationml/2006/main" mc:Ignorable="mv" mc:PreserveAttributes="mv:*" type="vertTitleAndTx" preserve="1">
+<p:sldLayout xmlns:a="http://schemas.openxmlformats.org/drawingml/2006/main" xmlns:r="http://schemas.openxmlformats.org/officeDocument/2006/relationships" xmlns:p="http://schemas.openxmlformats.org/presentationml/2006/main" type="vertTitleAndTx" preserve="1">
   <p:cSld name="Vertical Title and Text">
     <p:spTree>
       <p:nvGrpSpPr>
@@ -628,7 +630,7 @@
           <a:p>
             <a:fld id="{35545FA2-D69E-F44A-846D-1D09D44220AC}" type="datetimeFigureOut">
               <a:rPr lang="en-US" smtClean="0"/>
-              <a:t>4/12/11</a:t>
+              <a:t>5/17/11</a:t>
             </a:fld>
             <a:endParaRPr lang="en-US"/>
           </a:p>
@@ -685,7 +687,7 @@
 </file>
 
 <file path=ppt/slideLayouts/slideLayout2.xml><?xml version="1.0" encoding="utf-8"?>
-<p:sldLayout xmlns:a="http://schemas.openxmlformats.org/drawingml/2006/main" xmlns:r="http://schemas.openxmlformats.org/officeDocument/2006/relationships" xmlns:mc="http://schemas.openxmlformats.org/markup-compatibility/2006" xmlns:mv="urn:schemas-microsoft-com:mac:vml" xmlns:p="http://schemas.openxmlformats.org/presentationml/2006/main" mc:Ignorable="mv" mc:PreserveAttributes="mv:*" type="obj" preserve="1">
+<p:sldLayout xmlns:a="http://schemas.openxmlformats.org/drawingml/2006/main" xmlns:r="http://schemas.openxmlformats.org/officeDocument/2006/relationships" xmlns:p="http://schemas.openxmlformats.org/presentationml/2006/main" type="obj" preserve="1">
   <p:cSld name="Title and Content">
     <p:spTree>
       <p:nvGrpSpPr>
@@ -793,7 +795,7 @@
           <a:p>
             <a:fld id="{35545FA2-D69E-F44A-846D-1D09D44220AC}" type="datetimeFigureOut">
               <a:rPr lang="en-US" smtClean="0"/>
-              <a:t>4/12/11</a:t>
+              <a:t>5/17/11</a:t>
             </a:fld>
             <a:endParaRPr lang="en-US"/>
           </a:p>
@@ -850,7 +852,7 @@
 </file>
 
 <file path=ppt/slideLayouts/slideLayout3.xml><?xml version="1.0" encoding="utf-8"?>
-<p:sldLayout xmlns:a="http://schemas.openxmlformats.org/drawingml/2006/main" xmlns:r="http://schemas.openxmlformats.org/officeDocument/2006/relationships" xmlns:mc="http://schemas.openxmlformats.org/markup-compatibility/2006" xmlns:mv="urn:schemas-microsoft-com:mac:vml" xmlns:p="http://schemas.openxmlformats.org/presentationml/2006/main" mc:Ignorable="mv" mc:PreserveAttributes="mv:*" type="secHead" preserve="1">
+<p:sldLayout xmlns:a="http://schemas.openxmlformats.org/drawingml/2006/main" xmlns:r="http://schemas.openxmlformats.org/officeDocument/2006/relationships" xmlns:p="http://schemas.openxmlformats.org/presentationml/2006/main" type="secHead" preserve="1">
   <p:cSld name="Section Header">
     <p:spTree>
       <p:nvGrpSpPr>
@@ -1034,7 +1036,7 @@
           <a:p>
             <a:fld id="{35545FA2-D69E-F44A-846D-1D09D44220AC}" type="datetimeFigureOut">
               <a:rPr lang="en-US" smtClean="0"/>
-              <a:t>4/12/11</a:t>
+              <a:t>5/17/11</a:t>
             </a:fld>
             <a:endParaRPr lang="en-US"/>
           </a:p>
@@ -1091,7 +1093,7 @@
 </file>
 
 <file path=ppt/slideLayouts/slideLayout4.xml><?xml version="1.0" encoding="utf-8"?>
-<p:sldLayout xmlns:a="http://schemas.openxmlformats.org/drawingml/2006/main" xmlns:r="http://schemas.openxmlformats.org/officeDocument/2006/relationships" xmlns:mc="http://schemas.openxmlformats.org/markup-compatibility/2006" xmlns:mv="urn:schemas-microsoft-com:mac:vml" xmlns:p="http://schemas.openxmlformats.org/presentationml/2006/main" mc:Ignorable="mv" mc:PreserveAttributes="mv:*" type="twoObj" preserve="1">
+<p:sldLayout xmlns:a="http://schemas.openxmlformats.org/drawingml/2006/main" xmlns:r="http://schemas.openxmlformats.org/officeDocument/2006/relationships" xmlns:p="http://schemas.openxmlformats.org/presentationml/2006/main" type="twoObj" preserve="1">
   <p:cSld name="Two Content">
     <p:spTree>
       <p:nvGrpSpPr>
@@ -1317,7 +1319,7 @@
           <a:p>
             <a:fld id="{35545FA2-D69E-F44A-846D-1D09D44220AC}" type="datetimeFigureOut">
               <a:rPr lang="en-US" smtClean="0"/>
-              <a:t>4/12/11</a:t>
+              <a:t>5/17/11</a:t>
             </a:fld>
             <a:endParaRPr lang="en-US"/>
           </a:p>
@@ -1374,7 +1376,7 @@
 </file>
 
 <file path=ppt/slideLayouts/slideLayout5.xml><?xml version="1.0" encoding="utf-8"?>
-<p:sldLayout xmlns:a="http://schemas.openxmlformats.org/drawingml/2006/main" xmlns:r="http://schemas.openxmlformats.org/officeDocument/2006/relationships" xmlns:mc="http://schemas.openxmlformats.org/markup-compatibility/2006" xmlns:mv="urn:schemas-microsoft-com:mac:vml" xmlns:p="http://schemas.openxmlformats.org/presentationml/2006/main" mc:Ignorable="mv" mc:PreserveAttributes="mv:*" type="twoTxTwoObj" preserve="1">
+<p:sldLayout xmlns:a="http://schemas.openxmlformats.org/drawingml/2006/main" xmlns:r="http://schemas.openxmlformats.org/officeDocument/2006/relationships" xmlns:p="http://schemas.openxmlformats.org/presentationml/2006/main" type="twoTxTwoObj" preserve="1">
   <p:cSld name="Comparison">
     <p:spTree>
       <p:nvGrpSpPr>
@@ -1734,7 +1736,7 @@
           <a:p>
             <a:fld id="{35545FA2-D69E-F44A-846D-1D09D44220AC}" type="datetimeFigureOut">
               <a:rPr lang="en-US" smtClean="0"/>
-              <a:t>4/12/11</a:t>
+              <a:t>5/17/11</a:t>
             </a:fld>
             <a:endParaRPr lang="en-US"/>
           </a:p>
@@ -1791,7 +1793,7 @@
 </file>
 
 <file path=ppt/slideLayouts/slideLayout6.xml><?xml version="1.0" encoding="utf-8"?>
-<p:sldLayout xmlns:a="http://schemas.openxmlformats.org/drawingml/2006/main" xmlns:r="http://schemas.openxmlformats.org/officeDocument/2006/relationships" xmlns:mc="http://schemas.openxmlformats.org/markup-compatibility/2006" xmlns:mv="urn:schemas-microsoft-com:mac:vml" xmlns:p="http://schemas.openxmlformats.org/presentationml/2006/main" mc:Ignorable="mv" mc:PreserveAttributes="mv:*" type="titleOnly" preserve="1">
+<p:sldLayout xmlns:a="http://schemas.openxmlformats.org/drawingml/2006/main" xmlns:r="http://schemas.openxmlformats.org/officeDocument/2006/relationships" xmlns:p="http://schemas.openxmlformats.org/presentationml/2006/main" type="titleOnly" preserve="1">
   <p:cSld name="Title Only">
     <p:spTree>
       <p:nvGrpSpPr>
@@ -1847,7 +1849,7 @@
           <a:p>
             <a:fld id="{35545FA2-D69E-F44A-846D-1D09D44220AC}" type="datetimeFigureOut">
               <a:rPr lang="en-US" smtClean="0"/>
-              <a:t>4/12/11</a:t>
+              <a:t>5/17/11</a:t>
             </a:fld>
             <a:endParaRPr lang="en-US"/>
           </a:p>
@@ -1904,7 +1906,7 @@
 </file>
 
 <file path=ppt/slideLayouts/slideLayout7.xml><?xml version="1.0" encoding="utf-8"?>
-<p:sldLayout xmlns:a="http://schemas.openxmlformats.org/drawingml/2006/main" xmlns:r="http://schemas.openxmlformats.org/officeDocument/2006/relationships" xmlns:mc="http://schemas.openxmlformats.org/markup-compatibility/2006" xmlns:mv="urn:schemas-microsoft-com:mac:vml" xmlns:p="http://schemas.openxmlformats.org/presentationml/2006/main" mc:Ignorable="mv" mc:PreserveAttributes="mv:*" type="blank" preserve="1">
+<p:sldLayout xmlns:a="http://schemas.openxmlformats.org/drawingml/2006/main" xmlns:r="http://schemas.openxmlformats.org/officeDocument/2006/relationships" xmlns:p="http://schemas.openxmlformats.org/presentationml/2006/main" type="blank" preserve="1">
   <p:cSld name="Blank">
     <p:spTree>
       <p:nvGrpSpPr>
@@ -1937,7 +1939,7 @@
           <a:p>
             <a:fld id="{35545FA2-D69E-F44A-846D-1D09D44220AC}" type="datetimeFigureOut">
               <a:rPr lang="en-US" smtClean="0"/>
-              <a:t>4/12/11</a:t>
+              <a:t>5/17/11</a:t>
             </a:fld>
             <a:endParaRPr lang="en-US"/>
           </a:p>
@@ -1994,7 +1996,7 @@
 </file>
 
 <file path=ppt/slideLayouts/slideLayout8.xml><?xml version="1.0" encoding="utf-8"?>
-<p:sldLayout xmlns:a="http://schemas.openxmlformats.org/drawingml/2006/main" xmlns:r="http://schemas.openxmlformats.org/officeDocument/2006/relationships" xmlns:mc="http://schemas.openxmlformats.org/markup-compatibility/2006" xmlns:mv="urn:schemas-microsoft-com:mac:vml" xmlns:p="http://schemas.openxmlformats.org/presentationml/2006/main" mc:Ignorable="mv" mc:PreserveAttributes="mv:*" type="objTx" preserve="1">
+<p:sldLayout xmlns:a="http://schemas.openxmlformats.org/drawingml/2006/main" xmlns:r="http://schemas.openxmlformats.org/officeDocument/2006/relationships" xmlns:p="http://schemas.openxmlformats.org/presentationml/2006/main" type="objTx" preserve="1">
   <p:cSld name="Content with Caption">
     <p:spTree>
       <p:nvGrpSpPr>
@@ -2209,7 +2211,7 @@
           <a:p>
             <a:fld id="{35545FA2-D69E-F44A-846D-1D09D44220AC}" type="datetimeFigureOut">
               <a:rPr lang="en-US" smtClean="0"/>
-              <a:t>4/12/11</a:t>
+              <a:t>5/17/11</a:t>
             </a:fld>
             <a:endParaRPr lang="en-US"/>
           </a:p>
@@ -2266,7 +2268,7 @@
 </file>
 
 <file path=ppt/slideLayouts/slideLayout9.xml><?xml version="1.0" encoding="utf-8"?>
-<p:sldLayout xmlns:a="http://schemas.openxmlformats.org/drawingml/2006/main" xmlns:r="http://schemas.openxmlformats.org/officeDocument/2006/relationships" xmlns:mc="http://schemas.openxmlformats.org/markup-compatibility/2006" xmlns:mv="urn:schemas-microsoft-com:mac:vml" xmlns:p="http://schemas.openxmlformats.org/presentationml/2006/main" mc:Ignorable="mv" mc:PreserveAttributes="mv:*" type="picTx" preserve="1">
+<p:sldLayout xmlns:a="http://schemas.openxmlformats.org/drawingml/2006/main" xmlns:r="http://schemas.openxmlformats.org/officeDocument/2006/relationships" xmlns:p="http://schemas.openxmlformats.org/presentationml/2006/main" type="picTx" preserve="1">
   <p:cSld name="Picture with Caption">
     <p:spTree>
       <p:nvGrpSpPr>
@@ -2457,7 +2459,7 @@
           <a:p>
             <a:fld id="{35545FA2-D69E-F44A-846D-1D09D44220AC}" type="datetimeFigureOut">
               <a:rPr lang="en-US" smtClean="0"/>
-              <a:t>4/12/11</a:t>
+              <a:t>5/17/11</a:t>
             </a:fld>
             <a:endParaRPr lang="en-US"/>
           </a:p>
@@ -2514,7 +2516,7 @@
 </file>
 
 <file path=ppt/slideMasters/slideMaster1.xml><?xml version="1.0" encoding="utf-8"?>
-<p:sldMaster xmlns:a="http://schemas.openxmlformats.org/drawingml/2006/main" xmlns:r="http://schemas.openxmlformats.org/officeDocument/2006/relationships" xmlns:mc="http://schemas.openxmlformats.org/markup-compatibility/2006" xmlns:mv="urn:schemas-microsoft-com:mac:vml" xmlns:p="http://schemas.openxmlformats.org/presentationml/2006/main" mc:Ignorable="mv" mc:PreserveAttributes="mv:*">
+<p:sldMaster xmlns:a="http://schemas.openxmlformats.org/drawingml/2006/main" xmlns:r="http://schemas.openxmlformats.org/officeDocument/2006/relationships" xmlns:p="http://schemas.openxmlformats.org/presentationml/2006/main">
   <p:cSld>
     <p:bg>
       <p:bgRef idx="1001">
@@ -2665,7 +2667,7 @@
           <a:p>
             <a:fld id="{35545FA2-D69E-F44A-846D-1D09D44220AC}" type="datetimeFigureOut">
               <a:rPr lang="en-US" smtClean="0"/>
-              <a:t>4/12/11</a:t>
+              <a:t>5/17/11</a:t>
             </a:fld>
             <a:endParaRPr lang="en-US"/>
           </a:p>
@@ -3019,7 +3021,7 @@
 </file>
 
 <file path=ppt/slides/slide1.xml><?xml version="1.0" encoding="utf-8"?>
-<p:sld xmlns:a="http://schemas.openxmlformats.org/drawingml/2006/main" xmlns:r="http://schemas.openxmlformats.org/officeDocument/2006/relationships" xmlns:mc="http://schemas.openxmlformats.org/markup-compatibility/2006" xmlns:mv="urn:schemas-microsoft-com:mac:vml" xmlns:p="http://schemas.openxmlformats.org/presentationml/2006/main" mc:Ignorable="mv" mc:PreserveAttributes="mv:*">
+<p:sld xmlns:a="http://schemas.openxmlformats.org/drawingml/2006/main" xmlns:r="http://schemas.openxmlformats.org/officeDocument/2006/relationships" xmlns:p="http://schemas.openxmlformats.org/presentationml/2006/main">
   <p:cSld>
     <p:spTree>
       <p:nvGrpSpPr>
@@ -3078,6 +3080,188 @@
         </p:txBody>
       </p:sp>
     </p:spTree>
+  </p:cSld>
+  <p:clrMapOvr>
+    <a:masterClrMapping/>
+  </p:clrMapOvr>
+</p:sld>
+</file>
+
+<file path=ppt/slides/slide2.xml><?xml version="1.0" encoding="utf-8"?>
+<p:sld xmlns:a="http://schemas.openxmlformats.org/drawingml/2006/main" xmlns:r="http://schemas.openxmlformats.org/officeDocument/2006/relationships" xmlns:p="http://schemas.openxmlformats.org/presentationml/2006/main">
+  <p:cSld>
+    <p:spTree>
+      <p:nvGrpSpPr>
+        <p:cNvPr id="1" name=""/>
+        <p:cNvGrpSpPr/>
+        <p:nvPr/>
+      </p:nvGrpSpPr>
+      <p:grpSpPr>
+        <a:xfrm>
+          <a:off x="0" y="0"/>
+          <a:ext cx="0" cy="0"/>
+          <a:chOff x="0" y="0"/>
+          <a:chExt cx="0" cy="0"/>
+        </a:xfrm>
+      </p:grpSpPr>
+      <p:sp>
+        <p:nvSpPr>
+          <p:cNvPr id="2" name="Title 1"/>
+          <p:cNvSpPr>
+            <a:spLocks noGrp="1"/>
+          </p:cNvSpPr>
+          <p:nvPr>
+            <p:ph type="title"/>
+          </p:nvPr>
+        </p:nvSpPr>
+        <p:spPr/>
+        <p:txBody>
+          <a:bodyPr/>
+          <a:lstStyle/>
+          <a:p>
+            <a:r>
+              <a:rPr lang="en-US" dirty="0" smtClean="0"/>
+              <a:t>Test Slide Headline</a:t>
+            </a:r>
+            <a:endParaRPr lang="en-US" dirty="0"/>
+          </a:p>
+        </p:txBody>
+      </p:sp>
+      <p:sp>
+        <p:nvSpPr>
+          <p:cNvPr id="3" name="Content Placeholder 2"/>
+          <p:cNvSpPr>
+            <a:spLocks noGrp="1"/>
+          </p:cNvSpPr>
+          <p:nvPr>
+            <p:ph idx="1"/>
+          </p:nvPr>
+        </p:nvSpPr>
+        <p:spPr/>
+        <p:txBody>
+          <a:bodyPr/>
+          <a:lstStyle/>
+          <a:p>
+            <a:r>
+              <a:rPr lang="en-US" dirty="0" smtClean="0"/>
+              <a:t>Bullet point 1</a:t>
+            </a:r>
+          </a:p>
+          <a:p>
+            <a:r>
+              <a:rPr lang="en-US" dirty="0" smtClean="0"/>
+              <a:t>Bullet point 2</a:t>
+            </a:r>
+          </a:p>
+          <a:p>
+            <a:r>
+              <a:rPr lang="en-US" dirty="0" smtClean="0"/>
+              <a:t>Bullet Point 3</a:t>
+            </a:r>
+            <a:endParaRPr lang="en-US" dirty="0"/>
+          </a:p>
+        </p:txBody>
+      </p:sp>
+    </p:spTree>
+    <p:extLst>
+      <p:ext uri="{BB962C8B-B14F-4D97-AF65-F5344CB8AC3E}">
+        <p14:creationId xmlns:p14="http://schemas.microsoft.com/office/powerpoint/2010/main" val="2918426065"/>
+      </p:ext>
+    </p:extLst>
+  </p:cSld>
+  <p:clrMapOvr>
+    <a:masterClrMapping/>
+  </p:clrMapOvr>
+</p:sld>
+</file>
+
+<file path=ppt/slides/slide3.xml><?xml version="1.0" encoding="utf-8"?>
+<p:sld xmlns:a="http://schemas.openxmlformats.org/drawingml/2006/main" xmlns:r="http://schemas.openxmlformats.org/officeDocument/2006/relationships" xmlns:p="http://schemas.openxmlformats.org/presentationml/2006/main">
+  <p:cSld>
+    <p:spTree>
+      <p:nvGrpSpPr>
+        <p:cNvPr id="1" name=""/>
+        <p:cNvGrpSpPr/>
+        <p:nvPr/>
+      </p:nvGrpSpPr>
+      <p:grpSpPr>
+        <a:xfrm>
+          <a:off x="0" y="0"/>
+          <a:ext cx="0" cy="0"/>
+          <a:chOff x="0" y="0"/>
+          <a:chExt cx="0" cy="0"/>
+        </a:xfrm>
+      </p:grpSpPr>
+      <p:sp>
+        <p:nvSpPr>
+          <p:cNvPr id="2" name="Title 1"/>
+          <p:cNvSpPr>
+            <a:spLocks noGrp="1"/>
+          </p:cNvSpPr>
+          <p:nvPr>
+            <p:ph type="title"/>
+          </p:nvPr>
+        </p:nvSpPr>
+        <p:spPr/>
+        <p:txBody>
+          <a:bodyPr/>
+          <a:lstStyle/>
+          <a:p>
+            <a:r>
+              <a:rPr lang="en-US" dirty="0" smtClean="0"/>
+              <a:t>Image </a:t>
+            </a:r>
+            <a:r>
+              <a:rPr lang="en-US" dirty="0"/>
+              <a:t>S</a:t>
+            </a:r>
+            <a:r>
+              <a:rPr lang="en-US" dirty="0" smtClean="0"/>
+              <a:t>lide </a:t>
+            </a:r>
+            <a:r>
+              <a:rPr lang="en-US" dirty="0"/>
+              <a:t>H</a:t>
+            </a:r>
+            <a:r>
+              <a:rPr lang="en-US" dirty="0" smtClean="0"/>
+              <a:t>eadline</a:t>
+            </a:r>
+            <a:endParaRPr lang="en-US" dirty="0"/>
+          </a:p>
+        </p:txBody>
+      </p:sp>
+      <p:pic>
+        <p:nvPicPr>
+          <p:cNvPr id="4" name="Content Placeholder 3" descr="200235995-001.png"/>
+          <p:cNvPicPr>
+            <a:picLocks noGrp="1" noChangeAspect="1"/>
+          </p:cNvPicPr>
+          <p:nvPr>
+            <p:ph idx="1"/>
+          </p:nvPr>
+        </p:nvPicPr>
+        <p:blipFill>
+          <a:blip r:embed="rId2">
+            <a:extLst>
+              <a:ext uri="{28A0092B-C50C-407E-A947-70E740481C1C}">
+                <a14:useLocalDpi xmlns:a14="http://schemas.microsoft.com/office/drawing/2010/main" val="0"/>
+              </a:ext>
+            </a:extLst>
+          </a:blip>
+          <a:srcRect t="22502" b="22502"/>
+          <a:stretch>
+            <a:fillRect/>
+          </a:stretch>
+        </p:blipFill>
+        <p:spPr/>
+      </p:pic>
+    </p:spTree>
+    <p:extLst>
+      <p:ext uri="{BB962C8B-B14F-4D97-AF65-F5344CB8AC3E}">
+        <p14:creationId xmlns:p14="http://schemas.microsoft.com/office/powerpoint/2010/main" val="1729148137"/>
+      </p:ext>
+    </p:extLst>
   </p:cSld>
   <p:clrMapOvr>
     <a:masterClrMapping/>

</xml_diff>